<commit_message>
Update to Modern QDK, part 1: README and debugging assignment
</commit_message>
<xml_diff>
--- a/ProgrammingAssignmentSamples/DebuggingQuantumCode/DebuggingDJAgorithm-Solutions.pptx
+++ b/ProgrammingAssignmentSamples/DebuggingQuantumCode/DebuggingDJAgorithm-Solutions.pptx
@@ -8,24 +8,23 @@
     <p:sldMasterId id="2147484528" r:id="rId7"/>
   </p:sldMasterIdLst>
   <p:notesMasterIdLst>
-    <p:notesMasterId r:id="rId20"/>
+    <p:notesMasterId r:id="rId19"/>
   </p:notesMasterIdLst>
   <p:handoutMasterIdLst>
-    <p:handoutMasterId r:id="rId21"/>
+    <p:handoutMasterId r:id="rId20"/>
   </p:handoutMasterIdLst>
   <p:sldIdLst>
     <p:sldId id="1549" r:id="rId8"/>
     <p:sldId id="1619" r:id="rId9"/>
-    <p:sldId id="1943" r:id="rId10"/>
-    <p:sldId id="1944" r:id="rId11"/>
-    <p:sldId id="1947" r:id="rId12"/>
-    <p:sldId id="1955" r:id="rId13"/>
-    <p:sldId id="1948" r:id="rId14"/>
-    <p:sldId id="1949" r:id="rId15"/>
-    <p:sldId id="1950" r:id="rId16"/>
-    <p:sldId id="1951" r:id="rId17"/>
-    <p:sldId id="1953" r:id="rId18"/>
-    <p:sldId id="1954" r:id="rId19"/>
+    <p:sldId id="1955" r:id="rId10"/>
+    <p:sldId id="1947" r:id="rId11"/>
+    <p:sldId id="1944" r:id="rId12"/>
+    <p:sldId id="1948" r:id="rId13"/>
+    <p:sldId id="1949" r:id="rId14"/>
+    <p:sldId id="1950" r:id="rId15"/>
+    <p:sldId id="1951" r:id="rId16"/>
+    <p:sldId id="1953" r:id="rId17"/>
+    <p:sldId id="1954" r:id="rId18"/>
   </p:sldIdLst>
   <p:sldSz cx="12436475" cy="6994525"/>
   <p:notesSz cx="6858000" cy="9144000"/>
@@ -131,10 +130,9 @@
           <p14:sldIdLst>
             <p14:sldId id="1549"/>
             <p14:sldId id="1619"/>
-            <p14:sldId id="1943"/>
+            <p14:sldId id="1955"/>
+            <p14:sldId id="1947"/>
             <p14:sldId id="1944"/>
-            <p14:sldId id="1947"/>
-            <p14:sldId id="1955"/>
             <p14:sldId id="1948"/>
             <p14:sldId id="1949"/>
             <p14:sldId id="1950"/>
@@ -280,7 +278,7 @@
               <a:rPr lang="en-US" smtClean="0">
                 <a:latin typeface="Segoe UI" pitchFamily="34" charset="0"/>
               </a:rPr>
-              <a:t>2/28/2022 1:47 PM</a:t>
+              <a:t>8/21/2024 1:16 PM</a:t>
             </a:fld>
             <a:endParaRPr lang="en-US">
               <a:latin typeface="Segoe UI" pitchFamily="34" charset="0"/>
@@ -558,7 +556,7 @@
           <a:p>
             <a:fld id="{69203EEA-A6E8-4247-86C0-53D28D50C589}" type="datetime8">
               <a:rPr lang="en-US" smtClean="0"/>
-              <a:t>2/28/2022 1:47 PM</a:t>
+              <a:t>8/21/2024 12:52 PM</a:t>
             </a:fld>
             <a:endParaRPr lang="en-US"/>
           </a:p>
@@ -925,7 +923,7 @@
           <a:p>
             <a:fld id="{15001C37-B9DE-45A5-B648-43DAD4AADE89}" type="datetime8">
               <a:rPr lang="en-US" smtClean="0"/>
-              <a:t>2/28/2022 1:47 PM</a:t>
+              <a:t>8/21/2024 12:52 PM</a:t>
             </a:fld>
             <a:endParaRPr lang="en-US" dirty="0"/>
           </a:p>
@@ -1090,7 +1088,7 @@
           <a:p>
             <a:fld id="{FE7478CC-F5DF-447B-89E1-417D8164E0AD}" type="datetime8">
               <a:rPr lang="en-US" smtClean="0"/>
-              <a:t>2/28/2022 1:47 PM</a:t>
+              <a:t>8/21/2024 12:52 PM</a:t>
             </a:fld>
             <a:endParaRPr lang="en-US"/>
           </a:p>
@@ -1123,7 +1121,7 @@
     </p:spTree>
     <p:extLst>
       <p:ext uri="{BB962C8B-B14F-4D97-AF65-F5344CB8AC3E}">
-        <p14:creationId xmlns:p14="http://schemas.microsoft.com/office/powerpoint/2010/main" val="1092006610"/>
+        <p14:creationId xmlns:p14="http://schemas.microsoft.com/office/powerpoint/2010/main" val="712021876"/>
       </p:ext>
     </p:extLst>
   </p:cSld>
@@ -1255,7 +1253,7 @@
           <a:p>
             <a:fld id="{FE7478CC-F5DF-447B-89E1-417D8164E0AD}" type="datetime8">
               <a:rPr lang="en-US" smtClean="0"/>
-              <a:t>2/28/2022 1:47 PM</a:t>
+              <a:t>8/21/2024 12:52 PM</a:t>
             </a:fld>
             <a:endParaRPr lang="en-US"/>
           </a:p>
@@ -1288,7 +1286,7 @@
     </p:spTree>
     <p:extLst>
       <p:ext uri="{BB962C8B-B14F-4D97-AF65-F5344CB8AC3E}">
-        <p14:creationId xmlns:p14="http://schemas.microsoft.com/office/powerpoint/2010/main" val="3918276785"/>
+        <p14:creationId xmlns:p14="http://schemas.microsoft.com/office/powerpoint/2010/main" val="3161678939"/>
       </p:ext>
     </p:extLst>
   </p:cSld>
@@ -1420,7 +1418,7 @@
           <a:p>
             <a:fld id="{FE7478CC-F5DF-447B-89E1-417D8164E0AD}" type="datetime8">
               <a:rPr lang="en-US" smtClean="0"/>
-              <a:t>2/28/2022 1:47 PM</a:t>
+              <a:t>8/21/2024 12:52 PM</a:t>
             </a:fld>
             <a:endParaRPr lang="en-US"/>
           </a:p>
@@ -1453,7 +1451,7 @@
     </p:spTree>
     <p:extLst>
       <p:ext uri="{BB962C8B-B14F-4D97-AF65-F5344CB8AC3E}">
-        <p14:creationId xmlns:p14="http://schemas.microsoft.com/office/powerpoint/2010/main" val="3161678939"/>
+        <p14:creationId xmlns:p14="http://schemas.microsoft.com/office/powerpoint/2010/main" val="3918276785"/>
       </p:ext>
     </p:extLst>
   </p:cSld>
@@ -1585,7 +1583,7 @@
           <a:p>
             <a:fld id="{FE7478CC-F5DF-447B-89E1-417D8164E0AD}" type="datetime8">
               <a:rPr lang="en-US" smtClean="0"/>
-              <a:t>2/28/2022 3:58 PM</a:t>
+              <a:t>8/21/2024 12:52 PM</a:t>
             </a:fld>
             <a:endParaRPr lang="en-US"/>
           </a:p>
@@ -1609,7 +1607,7 @@
             <a:fld id="{B4008EB6-D09E-4580-8CD6-DDB14511944F}" type="slidenum">
               <a:rPr lang="en-US" smtClean="0"/>
               <a:pPr/>
-              <a:t>6</a:t>
+              <a:t>7</a:t>
             </a:fld>
             <a:endParaRPr lang="en-US"/>
           </a:p>
@@ -1618,7 +1616,7 @@
     </p:spTree>
     <p:extLst>
       <p:ext uri="{BB962C8B-B14F-4D97-AF65-F5344CB8AC3E}">
-        <p14:creationId xmlns:p14="http://schemas.microsoft.com/office/powerpoint/2010/main" val="712021876"/>
+        <p14:creationId xmlns:p14="http://schemas.microsoft.com/office/powerpoint/2010/main" val="3407266372"/>
       </p:ext>
     </p:extLst>
   </p:cSld>
@@ -1750,7 +1748,7 @@
           <a:p>
             <a:fld id="{FE7478CC-F5DF-447B-89E1-417D8164E0AD}" type="datetime8">
               <a:rPr lang="en-US" smtClean="0"/>
-              <a:t>2/28/2022 1:47 PM</a:t>
+              <a:t>8/21/2024 12:52 PM</a:t>
             </a:fld>
             <a:endParaRPr lang="en-US"/>
           </a:p>
@@ -1783,7 +1781,7 @@
     </p:spTree>
     <p:extLst>
       <p:ext uri="{BB962C8B-B14F-4D97-AF65-F5344CB8AC3E}">
-        <p14:creationId xmlns:p14="http://schemas.microsoft.com/office/powerpoint/2010/main" val="3407266372"/>
+        <p14:creationId xmlns:p14="http://schemas.microsoft.com/office/powerpoint/2010/main" val="2589986756"/>
       </p:ext>
     </p:extLst>
   </p:cSld>
@@ -1915,7 +1913,7 @@
           <a:p>
             <a:fld id="{FE7478CC-F5DF-447B-89E1-417D8164E0AD}" type="datetime8">
               <a:rPr lang="en-US" smtClean="0"/>
-              <a:t>2/28/2022 1:47 PM</a:t>
+              <a:t>8/21/2024 12:52 PM</a:t>
             </a:fld>
             <a:endParaRPr lang="en-US"/>
           </a:p>
@@ -1939,7 +1937,7 @@
             <a:fld id="{B4008EB6-D09E-4580-8CD6-DDB14511944F}" type="slidenum">
               <a:rPr lang="en-US" smtClean="0"/>
               <a:pPr/>
-              <a:t>9</a:t>
+              <a:t>10</a:t>
             </a:fld>
             <a:endParaRPr lang="en-US"/>
           </a:p>
@@ -1948,7 +1946,7 @@
     </p:spTree>
     <p:extLst>
       <p:ext uri="{BB962C8B-B14F-4D97-AF65-F5344CB8AC3E}">
-        <p14:creationId xmlns:p14="http://schemas.microsoft.com/office/powerpoint/2010/main" val="2589986756"/>
+        <p14:creationId xmlns:p14="http://schemas.microsoft.com/office/powerpoint/2010/main" val="3681199406"/>
       </p:ext>
     </p:extLst>
   </p:cSld>
@@ -2080,7 +2078,7 @@
           <a:p>
             <a:fld id="{FE7478CC-F5DF-447B-89E1-417D8164E0AD}" type="datetime8">
               <a:rPr lang="en-US" smtClean="0"/>
-              <a:t>2/28/2022 1:47 PM</a:t>
+              <a:t>8/21/2024 12:52 PM</a:t>
             </a:fld>
             <a:endParaRPr lang="en-US"/>
           </a:p>
@@ -2105,171 +2103,6 @@
               <a:rPr lang="en-US" smtClean="0"/>
               <a:pPr/>
               <a:t>11</a:t>
-            </a:fld>
-            <a:endParaRPr lang="en-US"/>
-          </a:p>
-        </p:txBody>
-      </p:sp>
-    </p:spTree>
-    <p:extLst>
-      <p:ext uri="{BB962C8B-B14F-4D97-AF65-F5344CB8AC3E}">
-        <p14:creationId xmlns:p14="http://schemas.microsoft.com/office/powerpoint/2010/main" val="3681199406"/>
-      </p:ext>
-    </p:extLst>
-  </p:cSld>
-  <p:clrMapOvr>
-    <a:masterClrMapping/>
-  </p:clrMapOvr>
-</p:notes>
-</file>
-
-<file path=ppt/notesSlides/notesSlide9.xml><?xml version="1.0" encoding="utf-8"?>
-<p:notes xmlns:a="http://schemas.openxmlformats.org/drawingml/2006/main" xmlns:r="http://schemas.openxmlformats.org/officeDocument/2006/relationships" xmlns:p="http://schemas.openxmlformats.org/presentationml/2006/main">
-  <p:cSld>
-    <p:spTree>
-      <p:nvGrpSpPr>
-        <p:cNvPr id="1" name=""/>
-        <p:cNvGrpSpPr/>
-        <p:nvPr/>
-      </p:nvGrpSpPr>
-      <p:grpSpPr>
-        <a:xfrm>
-          <a:off x="0" y="0"/>
-          <a:ext cx="0" cy="0"/>
-          <a:chOff x="0" y="0"/>
-          <a:chExt cx="0" cy="0"/>
-        </a:xfrm>
-      </p:grpSpPr>
-      <p:sp>
-        <p:nvSpPr>
-          <p:cNvPr id="2" name="Slide Image Placeholder 1"/>
-          <p:cNvSpPr>
-            <a:spLocks noGrp="1" noRot="1" noChangeAspect="1"/>
-          </p:cNvSpPr>
-          <p:nvPr>
-            <p:ph type="sldImg"/>
-          </p:nvPr>
-        </p:nvSpPr>
-        <p:spPr/>
-      </p:sp>
-      <p:sp>
-        <p:nvSpPr>
-          <p:cNvPr id="3" name="Notes Placeholder 2"/>
-          <p:cNvSpPr>
-            <a:spLocks noGrp="1"/>
-          </p:cNvSpPr>
-          <p:nvPr>
-            <p:ph type="body" idx="1"/>
-          </p:nvPr>
-        </p:nvSpPr>
-        <p:spPr/>
-        <p:txBody>
-          <a:bodyPr/>
-          <a:lstStyle/>
-          <a:p>
-            <a:endParaRPr lang="en-US" dirty="0"/>
-          </a:p>
-        </p:txBody>
-      </p:sp>
-      <p:sp>
-        <p:nvSpPr>
-          <p:cNvPr id="4" name="Header Placeholder 3"/>
-          <p:cNvSpPr>
-            <a:spLocks noGrp="1"/>
-          </p:cNvSpPr>
-          <p:nvPr>
-            <p:ph type="hdr" sz="quarter"/>
-          </p:nvPr>
-        </p:nvSpPr>
-        <p:spPr/>
-        <p:txBody>
-          <a:bodyPr/>
-          <a:lstStyle/>
-          <a:p>
-            <a:endParaRPr lang="en-US"/>
-          </a:p>
-        </p:txBody>
-      </p:sp>
-      <p:sp>
-        <p:nvSpPr>
-          <p:cNvPr id="5" name="Footer Placeholder 4"/>
-          <p:cNvSpPr>
-            <a:spLocks noGrp="1"/>
-          </p:cNvSpPr>
-          <p:nvPr>
-            <p:ph type="ftr" sz="quarter" idx="4"/>
-          </p:nvPr>
-        </p:nvSpPr>
-        <p:spPr/>
-        <p:txBody>
-          <a:bodyPr/>
-          <a:lstStyle/>
-          <a:p>
-            <a:pPr defTabSz="914099" eaLnBrk="0" hangingPunct="0"/>
-            <a:r>
-              <a:rPr lang="en-US" sz="400">
-                <a:gradFill>
-                  <a:gsLst>
-                    <a:gs pos="0">
-                      <a:prstClr val="black"/>
-                    </a:gs>
-                    <a:gs pos="100000">
-                      <a:prstClr val="black"/>
-                    </a:gs>
-                  </a:gsLst>
-                  <a:lin ang="5400000" scaled="0"/>
-                </a:gradFill>
-                <a:latin typeface="Segoe UI" pitchFamily="34" charset="0"/>
-                <a:ea typeface="Segoe UI" pitchFamily="34" charset="0"/>
-                <a:cs typeface="Segoe UI" pitchFamily="34" charset="0"/>
-              </a:rPr>
-              <a:t>© Microsoft Corporation. All rights reserved. MICROSOFT MAKES NO WARRANTIES, EXPRESS, IMPLIED OR STATUTORY, AS TO THE INFORMATION IN THIS PRESENTATION.</a:t>
-            </a:r>
-          </a:p>
-        </p:txBody>
-      </p:sp>
-      <p:sp>
-        <p:nvSpPr>
-          <p:cNvPr id="6" name="Date Placeholder 5"/>
-          <p:cNvSpPr>
-            <a:spLocks noGrp="1"/>
-          </p:cNvSpPr>
-          <p:nvPr>
-            <p:ph type="dt" idx="1"/>
-          </p:nvPr>
-        </p:nvSpPr>
-        <p:spPr/>
-        <p:txBody>
-          <a:bodyPr/>
-          <a:lstStyle/>
-          <a:p>
-            <a:fld id="{FE7478CC-F5DF-447B-89E1-417D8164E0AD}" type="datetime8">
-              <a:rPr lang="en-US" smtClean="0"/>
-              <a:t>2/28/2022 1:47 PM</a:t>
-            </a:fld>
-            <a:endParaRPr lang="en-US"/>
-          </a:p>
-        </p:txBody>
-      </p:sp>
-      <p:sp>
-        <p:nvSpPr>
-          <p:cNvPr id="7" name="Slide Number Placeholder 6"/>
-          <p:cNvSpPr>
-            <a:spLocks noGrp="1"/>
-          </p:cNvSpPr>
-          <p:nvPr>
-            <p:ph type="sldNum" sz="quarter" idx="5"/>
-          </p:nvPr>
-        </p:nvSpPr>
-        <p:spPr/>
-        <p:txBody>
-          <a:bodyPr/>
-          <a:lstStyle/>
-          <a:p>
-            <a:fld id="{B4008EB6-D09E-4580-8CD6-DDB14511944F}" type="slidenum">
-              <a:rPr lang="en-US" smtClean="0"/>
-              <a:pPr/>
-              <a:t>12</a:t>
             </a:fld>
             <a:endParaRPr lang="en-US"/>
           </a:p>
@@ -19289,7 +19122,11 @@
           <a:p>
             <a:r>
               <a:rPr lang="en-US" sz="6000" dirty="0"/>
-              <a:t>Programming assignment sample</a:t>
+              <a:t>Programming </a:t>
+            </a:r>
+            <a:r>
+              <a:rPr lang="en-US" sz="6000"/>
+              <a:t>assignment sample:</a:t>
             </a:r>
             <a:br>
               <a:rPr lang="en-US" sz="6000" dirty="0"/>
@@ -19338,13 +19175,13 @@
           <a:p>
             <a:r>
               <a:rPr lang="en-US" dirty="0"/>
-              <a:t>Senior Software Engineer</a:t>
+              <a:t>Principal Software Engineer</a:t>
             </a:r>
           </a:p>
           <a:p>
             <a:r>
               <a:rPr lang="en-US" dirty="0"/>
-              <a:t>Microsoft Quantum Systems</a:t>
+              <a:t>Microsoft Quantum</a:t>
             </a:r>
           </a:p>
         </p:txBody>
@@ -19427,10 +19264,10 @@
       </p:grpSpPr>
       <p:sp>
         <p:nvSpPr>
-          <p:cNvPr id="4" name="Title 3">
+          <p:cNvPr id="3" name="Text Placeholder 2">
             <a:extLst>
               <a:ext uri="{FF2B5EF4-FFF2-40B4-BE49-F238E27FC236}">
-                <a16:creationId xmlns:a16="http://schemas.microsoft.com/office/drawing/2014/main" id="{BC71B56D-A564-4BB1-B63B-CE04D6472132}"/>
+                <a16:creationId xmlns:a16="http://schemas.microsoft.com/office/drawing/2014/main" id="{94A47A0A-4DFE-4057-B29B-24238CB15434}"/>
               </a:ext>
             </a:extLst>
           </p:cNvPr>
@@ -19438,18 +19275,39 @@
             <a:spLocks noGrp="1"/>
           </p:cNvSpPr>
           <p:nvPr>
-            <p:ph type="title"/>
+            <p:ph type="body" sz="quarter" idx="10"/>
           </p:nvPr>
         </p:nvSpPr>
-        <p:spPr/>
+        <p:spPr>
+          <a:xfrm>
+            <a:off x="273841" y="552531"/>
+            <a:ext cx="11888787" cy="1126462"/>
+          </a:xfrm>
+        </p:spPr>
         <p:txBody>
           <a:bodyPr/>
           <a:lstStyle/>
           <a:p>
             <a:r>
               <a:rPr lang="en-US" dirty="0"/>
-              <a:t>Step 3: Logic/runtime errors</a:t>
-            </a:r>
+              <a:t>The code does not print the actual solution to 2</a:t>
+            </a:r>
+            <a:r>
+              <a:rPr lang="en-US" baseline="30000" dirty="0"/>
+              <a:t>nd</a:t>
+            </a:r>
+            <a:r>
+              <a:rPr lang="en-US" dirty="0"/>
+              <a:t> test</a:t>
+            </a:r>
+            <a:br>
+              <a:rPr lang="en-US" dirty="0"/>
+            </a:br>
+            <a:r>
+              <a:rPr lang="en-US" sz="3200" dirty="0"/>
+              <a:t>Need to use interpolated string instead of a regular one</a:t>
+            </a:r>
+            <a:endParaRPr lang="en-US" dirty="0"/>
           </a:p>
         </p:txBody>
       </p:sp>
@@ -19458,7 +19316,7 @@
           <p:cNvPr id="5" name="Rectangle 4">
             <a:extLst>
               <a:ext uri="{FF2B5EF4-FFF2-40B4-BE49-F238E27FC236}">
-                <a16:creationId xmlns:a16="http://schemas.microsoft.com/office/drawing/2014/main" id="{29C6DCB5-2DA9-4CBF-B3E1-A7988D0308D8}"/>
+                <a16:creationId xmlns:a16="http://schemas.microsoft.com/office/drawing/2014/main" id="{EB4EFD30-3368-424F-B532-4540DCAC8B89}"/>
               </a:ext>
             </a:extLst>
           </p:cNvPr>
@@ -19487,10 +19345,70 @@
           </a:p>
         </p:txBody>
       </p:sp>
+      <p:pic>
+        <p:nvPicPr>
+          <p:cNvPr id="4" name="Picture 3">
+            <a:extLst>
+              <a:ext uri="{FF2B5EF4-FFF2-40B4-BE49-F238E27FC236}">
+                <a16:creationId xmlns:a16="http://schemas.microsoft.com/office/drawing/2014/main" id="{D485B205-9B21-7CCC-6352-40B642360081}"/>
+              </a:ext>
+            </a:extLst>
+          </p:cNvPr>
+          <p:cNvPicPr>
+            <a:picLocks noChangeAspect="1"/>
+          </p:cNvPicPr>
+          <p:nvPr/>
+        </p:nvPicPr>
+        <p:blipFill>
+          <a:blip r:embed="rId3"/>
+          <a:stretch>
+            <a:fillRect/>
+          </a:stretch>
+        </p:blipFill>
+        <p:spPr>
+          <a:xfrm>
+            <a:off x="2369438" y="2393755"/>
+            <a:ext cx="7697592" cy="1709284"/>
+          </a:xfrm>
+          <a:prstGeom prst="rect">
+            <a:avLst/>
+          </a:prstGeom>
+        </p:spPr>
+      </p:pic>
+      <p:pic>
+        <p:nvPicPr>
+          <p:cNvPr id="8" name="Picture 7">
+            <a:extLst>
+              <a:ext uri="{FF2B5EF4-FFF2-40B4-BE49-F238E27FC236}">
+                <a16:creationId xmlns:a16="http://schemas.microsoft.com/office/drawing/2014/main" id="{85AEA143-3814-2E36-4D1E-B99C3CC64B81}"/>
+              </a:ext>
+            </a:extLst>
+          </p:cNvPr>
+          <p:cNvPicPr>
+            <a:picLocks noChangeAspect="1"/>
+          </p:cNvPicPr>
+          <p:nvPr/>
+        </p:nvPicPr>
+        <p:blipFill>
+          <a:blip r:embed="rId4"/>
+          <a:stretch>
+            <a:fillRect/>
+          </a:stretch>
+        </p:blipFill>
+        <p:spPr>
+          <a:xfrm>
+            <a:off x="929726" y="4817801"/>
+            <a:ext cx="10577016" cy="934412"/>
+          </a:xfrm>
+          <a:prstGeom prst="rect">
+            <a:avLst/>
+          </a:prstGeom>
+        </p:spPr>
+      </p:pic>
     </p:spTree>
     <p:extLst>
       <p:ext uri="{BB962C8B-B14F-4D97-AF65-F5344CB8AC3E}">
-        <p14:creationId xmlns:p14="http://schemas.microsoft.com/office/powerpoint/2010/main" val="3955919327"/>
+        <p14:creationId xmlns:p14="http://schemas.microsoft.com/office/powerpoint/2010/main" val="3160561834"/>
       </p:ext>
     </p:extLst>
   </p:cSld>
@@ -19539,7 +19457,7 @@
         <p:spPr>
           <a:xfrm>
             <a:off x="273841" y="552531"/>
-            <a:ext cx="11888787" cy="3163943"/>
+            <a:ext cx="11888787" cy="2068259"/>
           </a:xfrm>
         </p:spPr>
         <p:txBody>
@@ -19548,42 +19466,37 @@
           <a:p>
             <a:r>
               <a:rPr lang="en-US" dirty="0"/>
-              <a:t>The code does not print </a:t>
+              <a:t>The code outputs incorrect result for f(x) = 0!</a:t>
             </a:r>
             <a:br>
               <a:rPr lang="en-US" dirty="0"/>
             </a:br>
             <a:r>
-              <a:rPr lang="en-US" dirty="0"/>
-              <a:t>the actual solution to 2</a:t>
-            </a:r>
-            <a:r>
-              <a:rPr lang="en-US" baseline="30000" dirty="0"/>
-              <a:t>nd</a:t>
-            </a:r>
-            <a:r>
-              <a:rPr lang="en-US" dirty="0"/>
-              <a:t> test</a:t>
-            </a:r>
-            <a:br>
-              <a:rPr lang="en-US" dirty="0"/>
-            </a:br>
-            <a:endParaRPr lang="en-US" dirty="0"/>
-          </a:p>
-          <a:p>
-            <a:pPr marL="0" indent="0">
-              <a:buNone/>
-            </a:pPr>
-            <a:r>
               <a:rPr lang="en-US" sz="3200" dirty="0"/>
-              <a:t>  Need to use interpolated string</a:t>
+              <a:t>Deutsch-</a:t>
+            </a:r>
+            <a:r>
+              <a:rPr lang="en-US" sz="3200" dirty="0" err="1"/>
+              <a:t>Jozsa</a:t>
+            </a:r>
+            <a:r>
+              <a:rPr lang="en-US" sz="3200" dirty="0"/>
+              <a:t> algorithm should return “constant” </a:t>
+            </a:r>
+            <a:r>
+              <a:rPr lang="en-US" sz="3200" dirty="0" err="1"/>
+              <a:t>iff</a:t>
+            </a:r>
+            <a:r>
+              <a:rPr lang="en-US" sz="3200" dirty="0"/>
+              <a:t> </a:t>
             </a:r>
             <a:br>
               <a:rPr lang="en-US" sz="3200" dirty="0"/>
             </a:br>
             <a:r>
               <a:rPr lang="en-US" sz="3200" dirty="0"/>
-              <a:t>  instead of a regular one</a:t>
+              <a:t>all measurement results are Zeros, not Ones as written in the code</a:t>
             </a:r>
             <a:br>
               <a:rPr lang="en-US" dirty="0"/>
@@ -19628,10 +19541,10 @@
       </p:sp>
       <p:pic>
         <p:nvPicPr>
-          <p:cNvPr id="7" name="Picture 6">
+          <p:cNvPr id="6" name="Picture 5">
             <a:extLst>
               <a:ext uri="{FF2B5EF4-FFF2-40B4-BE49-F238E27FC236}">
-                <a16:creationId xmlns:a16="http://schemas.microsoft.com/office/drawing/2014/main" id="{CF57FF70-17E7-47DC-9A6E-C43507C1F701}"/>
+                <a16:creationId xmlns:a16="http://schemas.microsoft.com/office/drawing/2014/main" id="{E14C6AC6-80D8-A779-E366-EDDFF4D43386}"/>
               </a:ext>
             </a:extLst>
           </p:cNvPr>
@@ -19648,8 +19561,8 @@
         </p:blipFill>
         <p:spPr>
           <a:xfrm>
-            <a:off x="6431788" y="915760"/>
-            <a:ext cx="5730839" cy="407268"/>
+            <a:off x="3619237" y="2333711"/>
+            <a:ext cx="5197994" cy="1719735"/>
           </a:xfrm>
           <a:prstGeom prst="rect">
             <a:avLst/>
@@ -19658,10 +19571,10 @@
       </p:pic>
       <p:pic>
         <p:nvPicPr>
-          <p:cNvPr id="11" name="Picture 10">
+          <p:cNvPr id="8" name="Picture 7">
             <a:extLst>
               <a:ext uri="{FF2B5EF4-FFF2-40B4-BE49-F238E27FC236}">
-                <a16:creationId xmlns:a16="http://schemas.microsoft.com/office/drawing/2014/main" id="{1AA41EA9-5D92-4C65-B18F-E455DD41D017}"/>
+                <a16:creationId xmlns:a16="http://schemas.microsoft.com/office/drawing/2014/main" id="{070237B2-F60D-DB10-FBC2-D61520861409}"/>
               </a:ext>
             </a:extLst>
           </p:cNvPr>
@@ -19678,219 +19591,8 @@
         </p:blipFill>
         <p:spPr>
           <a:xfrm>
-            <a:off x="273841" y="4228452"/>
-            <a:ext cx="11888787" cy="828807"/>
-          </a:xfrm>
-          <a:prstGeom prst="rect">
-            <a:avLst/>
-          </a:prstGeom>
-        </p:spPr>
-      </p:pic>
-    </p:spTree>
-    <p:extLst>
-      <p:ext uri="{BB962C8B-B14F-4D97-AF65-F5344CB8AC3E}">
-        <p14:creationId xmlns:p14="http://schemas.microsoft.com/office/powerpoint/2010/main" val="3160561834"/>
-      </p:ext>
-    </p:extLst>
-  </p:cSld>
-  <p:clrMapOvr>
-    <a:masterClrMapping/>
-  </p:clrMapOvr>
-  <p:transition>
-    <p:fade/>
-  </p:transition>
-</p:sld>
-</file>
-
-<file path=ppt/slides/slide12.xml><?xml version="1.0" encoding="utf-8"?>
-<p:sld xmlns:a="http://schemas.openxmlformats.org/drawingml/2006/main" xmlns:r="http://schemas.openxmlformats.org/officeDocument/2006/relationships" xmlns:p="http://schemas.openxmlformats.org/presentationml/2006/main">
-  <p:cSld>
-    <p:spTree>
-      <p:nvGrpSpPr>
-        <p:cNvPr id="1" name=""/>
-        <p:cNvGrpSpPr/>
-        <p:nvPr/>
-      </p:nvGrpSpPr>
-      <p:grpSpPr>
-        <a:xfrm>
-          <a:off x="0" y="0"/>
-          <a:ext cx="0" cy="0"/>
-          <a:chOff x="0" y="0"/>
-          <a:chExt cx="0" cy="0"/>
-        </a:xfrm>
-      </p:grpSpPr>
-      <p:sp>
-        <p:nvSpPr>
-          <p:cNvPr id="3" name="Text Placeholder 2">
-            <a:extLst>
-              <a:ext uri="{FF2B5EF4-FFF2-40B4-BE49-F238E27FC236}">
-                <a16:creationId xmlns:a16="http://schemas.microsoft.com/office/drawing/2014/main" id="{94A47A0A-4DFE-4057-B29B-24238CB15434}"/>
-              </a:ext>
-            </a:extLst>
-          </p:cNvPr>
-          <p:cNvSpPr>
-            <a:spLocks noGrp="1"/>
-          </p:cNvSpPr>
-          <p:nvPr>
-            <p:ph type="body" sz="quarter" idx="10"/>
-          </p:nvPr>
-        </p:nvSpPr>
-        <p:spPr>
-          <a:xfrm>
-            <a:off x="273841" y="552531"/>
-            <a:ext cx="11888787" cy="3163943"/>
-          </a:xfrm>
-        </p:spPr>
-        <p:txBody>
-          <a:bodyPr/>
-          <a:lstStyle/>
-          <a:p>
-            <a:r>
-              <a:rPr lang="en-US" dirty="0"/>
-              <a:t>The code outputs incorrect </a:t>
-            </a:r>
-            <a:br>
-              <a:rPr lang="en-US" dirty="0"/>
-            </a:br>
-            <a:r>
-              <a:rPr lang="en-US" dirty="0"/>
-              <a:t>result for f(x) = 0!</a:t>
-            </a:r>
-            <a:br>
-              <a:rPr lang="en-US" dirty="0"/>
-            </a:br>
-            <a:endParaRPr lang="en-US" dirty="0"/>
-          </a:p>
-          <a:p>
-            <a:pPr marL="0" indent="0">
-              <a:buNone/>
-            </a:pPr>
-            <a:r>
-              <a:rPr lang="en-US" sz="3200" dirty="0"/>
-              <a:t>  Deutsch-</a:t>
-            </a:r>
-            <a:r>
-              <a:rPr lang="en-US" sz="3200" dirty="0" err="1"/>
-              <a:t>Jozsa</a:t>
-            </a:r>
-            <a:r>
-              <a:rPr lang="en-US" sz="3200" dirty="0"/>
-              <a:t> algorithm should return “constant” </a:t>
-            </a:r>
-            <a:r>
-              <a:rPr lang="en-US" sz="3200" dirty="0" err="1"/>
-              <a:t>iff</a:t>
-            </a:r>
-            <a:r>
-              <a:rPr lang="en-US" sz="3200" dirty="0"/>
-              <a:t> </a:t>
-            </a:r>
-            <a:br>
-              <a:rPr lang="en-US" sz="3200" dirty="0"/>
-            </a:br>
-            <a:r>
-              <a:rPr lang="en-US" sz="3200" dirty="0"/>
-              <a:t>  all measurement results are Zeros, not Ones </a:t>
-            </a:r>
-            <a:r>
-              <a:rPr lang="en-US" sz="3200"/>
-              <a:t>as written in the code</a:t>
-            </a:r>
-            <a:br>
-              <a:rPr lang="en-US" dirty="0"/>
-            </a:br>
-            <a:endParaRPr lang="en-US" dirty="0"/>
-          </a:p>
-        </p:txBody>
-      </p:sp>
-      <p:sp>
-        <p:nvSpPr>
-          <p:cNvPr id="5" name="Rectangle 4">
-            <a:extLst>
-              <a:ext uri="{FF2B5EF4-FFF2-40B4-BE49-F238E27FC236}">
-                <a16:creationId xmlns:a16="http://schemas.microsoft.com/office/drawing/2014/main" id="{EB4EFD30-3368-424F-B532-4540DCAC8B89}"/>
-              </a:ext>
-            </a:extLst>
-          </p:cNvPr>
-          <p:cNvSpPr/>
-          <p:nvPr/>
-        </p:nvSpPr>
-        <p:spPr>
-          <a:xfrm>
-            <a:off x="10003378" y="6687063"/>
-            <a:ext cx="2238113" cy="246221"/>
-          </a:xfrm>
-          <a:prstGeom prst="rect">
-            <a:avLst/>
-          </a:prstGeom>
-        </p:spPr>
-        <p:txBody>
-          <a:bodyPr wrap="none">
-            <a:spAutoFit/>
-          </a:bodyPr>
-          <a:lstStyle/>
-          <a:p>
-            <a:r>
-              <a:rPr lang="en-US" sz="1000" dirty="0"/>
-              <a:t>(c) 2020 Microsoft. All rights reserved.</a:t>
-            </a:r>
-          </a:p>
-        </p:txBody>
-      </p:sp>
-      <p:pic>
-        <p:nvPicPr>
-          <p:cNvPr id="4" name="Picture 3">
-            <a:extLst>
-              <a:ext uri="{FF2B5EF4-FFF2-40B4-BE49-F238E27FC236}">
-                <a16:creationId xmlns:a16="http://schemas.microsoft.com/office/drawing/2014/main" id="{28B2EFE8-8925-47A9-BA9C-B5BBF54395E2}"/>
-              </a:ext>
-            </a:extLst>
-          </p:cNvPr>
-          <p:cNvPicPr>
-            <a:picLocks noChangeAspect="1"/>
-          </p:cNvPicPr>
-          <p:nvPr/>
-        </p:nvPicPr>
-        <p:blipFill>
-          <a:blip r:embed="rId3"/>
-          <a:stretch>
-            <a:fillRect/>
-          </a:stretch>
-        </p:blipFill>
-        <p:spPr>
-          <a:xfrm>
-            <a:off x="7264195" y="974182"/>
-            <a:ext cx="4064205" cy="540093"/>
-          </a:xfrm>
-          <a:prstGeom prst="rect">
-            <a:avLst/>
-          </a:prstGeom>
-        </p:spPr>
-      </p:pic>
-      <p:pic>
-        <p:nvPicPr>
-          <p:cNvPr id="9" name="Picture 8">
-            <a:extLst>
-              <a:ext uri="{FF2B5EF4-FFF2-40B4-BE49-F238E27FC236}">
-                <a16:creationId xmlns:a16="http://schemas.microsoft.com/office/drawing/2014/main" id="{B241C946-29C0-4522-BD9A-A672619D2B9C}"/>
-              </a:ext>
-            </a:extLst>
-          </p:cNvPr>
-          <p:cNvPicPr>
-            <a:picLocks noChangeAspect="1"/>
-          </p:cNvPicPr>
-          <p:nvPr/>
-        </p:nvPicPr>
-        <p:blipFill>
-          <a:blip r:embed="rId4"/>
-          <a:stretch>
-            <a:fillRect/>
-          </a:stretch>
-        </p:blipFill>
-        <p:spPr>
-          <a:xfrm>
-            <a:off x="744515" y="3497262"/>
-            <a:ext cx="10947443" cy="2035101"/>
+            <a:off x="3518376" y="4196647"/>
+            <a:ext cx="5399721" cy="1896824"/>
           </a:xfrm>
           <a:prstGeom prst="rect">
             <a:avLst/>
@@ -20048,7 +19750,7 @@
         </p:nvSpPr>
         <p:spPr>
           <a:xfrm>
-            <a:off x="273843" y="1115800"/>
+            <a:off x="273843" y="976653"/>
             <a:ext cx="11888787" cy="1181862"/>
           </a:xfrm>
         </p:spPr>
@@ -20058,27 +19760,14 @@
           <a:p>
             <a:r>
               <a:rPr lang="en-US" dirty="0"/>
-              <a:t>Missing </a:t>
-            </a:r>
-            <a:r>
-              <a:rPr lang="en-US" dirty="0">
-                <a:solidFill>
-                  <a:srgbClr val="0000FF"/>
-                </a:solidFill>
-                <a:latin typeface="Consolas" panose="020B0609020204030204" pitchFamily="49" charset="0"/>
-              </a:rPr>
-              <a:t>open</a:t>
-            </a:r>
-            <a:r>
-              <a:rPr lang="en-US" dirty="0"/>
-              <a:t> statement </a:t>
+              <a:t>Incorrect type for the first parameter of the operation</a:t>
             </a:r>
             <a:br>
               <a:rPr lang="en-US" dirty="0"/>
             </a:br>
             <a:r>
               <a:rPr lang="en-US" dirty="0"/>
-              <a:t>for library operation</a:t>
+              <a:t>produced by the Controlled functor (must be an array)</a:t>
             </a:r>
           </a:p>
         </p:txBody>
@@ -20122,7 +19811,7 @@
           <p:cNvPr id="4" name="Picture 3">
             <a:extLst>
               <a:ext uri="{FF2B5EF4-FFF2-40B4-BE49-F238E27FC236}">
-                <a16:creationId xmlns:a16="http://schemas.microsoft.com/office/drawing/2014/main" id="{491ED975-6BF1-467B-9AAA-BBD751853BDD}"/>
+                <a16:creationId xmlns:a16="http://schemas.microsoft.com/office/drawing/2014/main" id="{2488C067-D6C0-4D03-F04A-32B6737539DA}"/>
               </a:ext>
             </a:extLst>
           </p:cNvPr>
@@ -20131,15 +19820,16 @@
           </p:cNvPicPr>
           <p:nvPr/>
         </p:nvPicPr>
-        <p:blipFill rotWithShape="1">
+        <p:blipFill>
           <a:blip r:embed="rId3"/>
-          <a:srcRect t="8046"/>
-          <a:stretch/>
+          <a:stretch>
+            <a:fillRect/>
+          </a:stretch>
         </p:blipFill>
         <p:spPr>
           <a:xfrm>
-            <a:off x="6699848" y="1329690"/>
-            <a:ext cx="4478442" cy="318356"/>
+            <a:off x="533716" y="4817009"/>
+            <a:ext cx="11369039" cy="1511565"/>
           </a:xfrm>
           <a:prstGeom prst="rect">
             <a:avLst/>
@@ -20151,7 +19841,7 @@
           <p:cNvPr id="11" name="Picture 10">
             <a:extLst>
               <a:ext uri="{FF2B5EF4-FFF2-40B4-BE49-F238E27FC236}">
-                <a16:creationId xmlns:a16="http://schemas.microsoft.com/office/drawing/2014/main" id="{804B15CC-97AC-406C-8A21-E381DC72E5A0}"/>
+                <a16:creationId xmlns:a16="http://schemas.microsoft.com/office/drawing/2014/main" id="{ECE2BC6D-0C9F-507C-EBE2-377288CB001E}"/>
               </a:ext>
             </a:extLst>
           </p:cNvPr>
@@ -20162,14 +19852,13 @@
         </p:nvPicPr>
         <p:blipFill>
           <a:blip r:embed="rId4"/>
-          <a:stretch>
-            <a:fillRect/>
-          </a:stretch>
+          <a:srcRect l="823"/>
+          <a:stretch/>
         </p:blipFill>
         <p:spPr>
           <a:xfrm>
-            <a:off x="273842" y="3495243"/>
-            <a:ext cx="11888787" cy="1281301"/>
+            <a:off x="500009" y="2732570"/>
+            <a:ext cx="11369039" cy="1510383"/>
           </a:xfrm>
           <a:prstGeom prst="rect">
             <a:avLst/>
@@ -20179,7 +19868,7 @@
     </p:spTree>
     <p:extLst>
       <p:ext uri="{BB962C8B-B14F-4D97-AF65-F5344CB8AC3E}">
-        <p14:creationId xmlns:p14="http://schemas.microsoft.com/office/powerpoint/2010/main" val="3539935650"/>
+        <p14:creationId xmlns:p14="http://schemas.microsoft.com/office/powerpoint/2010/main" val="1476856047"/>
       </p:ext>
     </p:extLst>
   </p:cSld>
@@ -20228,7 +19917,7 @@
         <p:spPr>
           <a:xfrm>
             <a:off x="273843" y="976653"/>
-            <a:ext cx="11888787" cy="2179058"/>
+            <a:ext cx="11888787" cy="683264"/>
           </a:xfrm>
         </p:spPr>
         <p:txBody>
@@ -20237,37 +19926,7 @@
           <a:p>
             <a:r>
               <a:rPr lang="en-US" dirty="0"/>
-              <a:t>Cannot generate</a:t>
-            </a:r>
-            <a:br>
-              <a:rPr lang="en-US" dirty="0"/>
-            </a:br>
-            <a:r>
-              <a:rPr lang="en-US" dirty="0">
-                <a:solidFill>
-                  <a:srgbClr val="0000FF"/>
-                </a:solidFill>
-                <a:latin typeface="Consolas" panose="020B0609020204030204" pitchFamily="49" charset="0"/>
-              </a:rPr>
-              <a:t>Adjoint</a:t>
-            </a:r>
-            <a:r>
-              <a:rPr lang="en-US" dirty="0"/>
-              <a:t> automatically</a:t>
-            </a:r>
-            <a:br>
-              <a:rPr lang="en-US" dirty="0"/>
-            </a:br>
-            <a:r>
-              <a:rPr lang="en-US" dirty="0"/>
-              <a:t>(within-apply block takes</a:t>
-            </a:r>
-            <a:br>
-              <a:rPr lang="en-US" dirty="0"/>
-            </a:br>
-            <a:r>
-              <a:rPr lang="en-US" dirty="0"/>
-              <a:t>adjoint of its contents)</a:t>
+              <a:t>Incorrect syntax for qubit allocation</a:t>
             </a:r>
           </a:p>
         </p:txBody>
@@ -20308,10 +19967,10 @@
       </p:sp>
       <p:pic>
         <p:nvPicPr>
-          <p:cNvPr id="2" name="Picture 1">
+          <p:cNvPr id="7" name="Picture 6">
             <a:extLst>
               <a:ext uri="{FF2B5EF4-FFF2-40B4-BE49-F238E27FC236}">
-                <a16:creationId xmlns:a16="http://schemas.microsoft.com/office/drawing/2014/main" id="{4D8B674D-B4E6-4F78-8B8B-3A3C67F15B95}"/>
+                <a16:creationId xmlns:a16="http://schemas.microsoft.com/office/drawing/2014/main" id="{6931F4B4-730F-C2E8-188F-E089F7783F39}"/>
               </a:ext>
             </a:extLst>
           </p:cNvPr>
@@ -20328,8 +19987,8 @@
         </p:blipFill>
         <p:spPr>
           <a:xfrm>
-            <a:off x="5963203" y="1378969"/>
-            <a:ext cx="6199427" cy="1323625"/>
+            <a:off x="841829" y="2383619"/>
+            <a:ext cx="10752813" cy="1499191"/>
           </a:xfrm>
           <a:prstGeom prst="rect">
             <a:avLst/>
@@ -20338,10 +19997,10 @@
       </p:pic>
       <p:pic>
         <p:nvPicPr>
-          <p:cNvPr id="6" name="Picture 5">
+          <p:cNvPr id="9" name="Picture 8">
             <a:extLst>
               <a:ext uri="{FF2B5EF4-FFF2-40B4-BE49-F238E27FC236}">
-                <a16:creationId xmlns:a16="http://schemas.microsoft.com/office/drawing/2014/main" id="{523FDC34-E2A0-4BE2-889F-82059ABB1128}"/>
+                <a16:creationId xmlns:a16="http://schemas.microsoft.com/office/drawing/2014/main" id="{5D457EE6-A98D-258F-F864-C219B10C8495}"/>
               </a:ext>
             </a:extLst>
           </p:cNvPr>
@@ -20358,8 +20017,8 @@
         </p:blipFill>
         <p:spPr>
           <a:xfrm>
-            <a:off x="273842" y="3321946"/>
-            <a:ext cx="11906555" cy="1791921"/>
+            <a:off x="3798453" y="4606512"/>
+            <a:ext cx="4839566" cy="889626"/>
           </a:xfrm>
           <a:prstGeom prst="rect">
             <a:avLst/>
@@ -20369,7 +20028,7 @@
     </p:spTree>
     <p:extLst>
       <p:ext uri="{BB962C8B-B14F-4D97-AF65-F5344CB8AC3E}">
-        <p14:creationId xmlns:p14="http://schemas.microsoft.com/office/powerpoint/2010/main" val="2509656599"/>
+        <p14:creationId xmlns:p14="http://schemas.microsoft.com/office/powerpoint/2010/main" val="2854535969"/>
       </p:ext>
     </p:extLst>
   </p:cSld>
@@ -20427,14 +20086,27 @@
           <a:p>
             <a:r>
               <a:rPr lang="en-US" dirty="0"/>
-              <a:t>Incorrect syntax for </a:t>
+              <a:t>Cannot generate </a:t>
+            </a:r>
+            <a:r>
+              <a:rPr lang="en-US" dirty="0">
+                <a:solidFill>
+                  <a:srgbClr val="0000FF"/>
+                </a:solidFill>
+                <a:latin typeface="Consolas" panose="020B0609020204030204" pitchFamily="49" charset="0"/>
+              </a:rPr>
+              <a:t>Adjoint</a:t>
+            </a:r>
+            <a:r>
+              <a:rPr lang="en-US" dirty="0"/>
+              <a:t> automatically</a:t>
             </a:r>
             <a:br>
               <a:rPr lang="en-US" dirty="0"/>
             </a:br>
             <a:r>
               <a:rPr lang="en-US" dirty="0"/>
-              <a:t>qubit allocation</a:t>
+              <a:t>(within-apply block takes adjoint of its contents)</a:t>
             </a:r>
           </a:p>
         </p:txBody>
@@ -20475,10 +20147,10 @@
       </p:sp>
       <p:pic>
         <p:nvPicPr>
-          <p:cNvPr id="4" name="Picture 3">
+          <p:cNvPr id="7" name="Picture 6">
             <a:extLst>
               <a:ext uri="{FF2B5EF4-FFF2-40B4-BE49-F238E27FC236}">
-                <a16:creationId xmlns:a16="http://schemas.microsoft.com/office/drawing/2014/main" id="{7CBB6FFB-12EB-4DE3-85C1-652B7ECE6852}"/>
+                <a16:creationId xmlns:a16="http://schemas.microsoft.com/office/drawing/2014/main" id="{69E30699-1533-7B46-AC95-17CB5A20A3BE}"/>
               </a:ext>
             </a:extLst>
           </p:cNvPr>
@@ -20495,8 +20167,8 @@
         </p:blipFill>
         <p:spPr>
           <a:xfrm>
-            <a:off x="5969009" y="1058583"/>
-            <a:ext cx="5661084" cy="1018002"/>
+            <a:off x="1249150" y="2378269"/>
+            <a:ext cx="9938174" cy="2237986"/>
           </a:xfrm>
           <a:prstGeom prst="rect">
             <a:avLst/>
@@ -20505,10 +20177,10 @@
       </p:pic>
       <p:pic>
         <p:nvPicPr>
-          <p:cNvPr id="6" name="Picture 5">
+          <p:cNvPr id="9" name="Picture 8">
             <a:extLst>
               <a:ext uri="{FF2B5EF4-FFF2-40B4-BE49-F238E27FC236}">
-                <a16:creationId xmlns:a16="http://schemas.microsoft.com/office/drawing/2014/main" id="{4B197585-9377-4727-B9AA-83A18F53CD7F}"/>
+                <a16:creationId xmlns:a16="http://schemas.microsoft.com/office/drawing/2014/main" id="{639760D7-364D-C7BE-32F3-89479D80FA47}"/>
               </a:ext>
             </a:extLst>
           </p:cNvPr>
@@ -20525,8 +20197,8 @@
         </p:blipFill>
         <p:spPr>
           <a:xfrm>
-            <a:off x="275684" y="3192680"/>
-            <a:ext cx="11965807" cy="1643330"/>
+            <a:off x="4459176" y="4616255"/>
+            <a:ext cx="3518119" cy="1491263"/>
           </a:xfrm>
           <a:prstGeom prst="rect">
             <a:avLst/>
@@ -20536,7 +20208,7 @@
     </p:spTree>
     <p:extLst>
       <p:ext uri="{BB962C8B-B14F-4D97-AF65-F5344CB8AC3E}">
-        <p14:creationId xmlns:p14="http://schemas.microsoft.com/office/powerpoint/2010/main" val="2854535969"/>
+        <p14:creationId xmlns:p14="http://schemas.microsoft.com/office/powerpoint/2010/main" val="2509656599"/>
       </p:ext>
     </p:extLst>
   </p:cSld>
@@ -20568,10 +20240,10 @@
       </p:grpSpPr>
       <p:sp>
         <p:nvSpPr>
-          <p:cNvPr id="3" name="Text Placeholder 2">
+          <p:cNvPr id="4" name="Title 3">
             <a:extLst>
               <a:ext uri="{FF2B5EF4-FFF2-40B4-BE49-F238E27FC236}">
-                <a16:creationId xmlns:a16="http://schemas.microsoft.com/office/drawing/2014/main" id="{94A47A0A-4DFE-4057-B29B-24238CB15434}"/>
+                <a16:creationId xmlns:a16="http://schemas.microsoft.com/office/drawing/2014/main" id="{BC71B56D-A564-4BB1-B63B-CE04D6472132}"/>
               </a:ext>
             </a:extLst>
           </p:cNvPr>
@@ -20579,43 +20251,17 @@
             <a:spLocks noGrp="1"/>
           </p:cNvSpPr>
           <p:nvPr>
-            <p:ph type="body" sz="quarter" idx="10"/>
+            <p:ph type="title"/>
           </p:nvPr>
         </p:nvSpPr>
-        <p:spPr>
-          <a:xfrm>
-            <a:off x="273843" y="976653"/>
-            <a:ext cx="11888787" cy="2179058"/>
-          </a:xfrm>
-        </p:spPr>
+        <p:spPr/>
         <p:txBody>
           <a:bodyPr/>
           <a:lstStyle/>
           <a:p>
             <a:r>
               <a:rPr lang="en-US" dirty="0"/>
-              <a:t>Incorrect type for the first</a:t>
-            </a:r>
-            <a:br>
-              <a:rPr lang="en-US" dirty="0"/>
-            </a:br>
-            <a:r>
-              <a:rPr lang="en-US" dirty="0"/>
-              <a:t>parameter of the operation</a:t>
-            </a:r>
-            <a:br>
-              <a:rPr lang="en-US" dirty="0"/>
-            </a:br>
-            <a:r>
-              <a:rPr lang="en-US" dirty="0"/>
-              <a:t>produced by the Controlled</a:t>
-            </a:r>
-            <a:br>
-              <a:rPr lang="en-US" dirty="0"/>
-            </a:br>
-            <a:r>
-              <a:rPr lang="en-US" dirty="0"/>
-              <a:t>functor (must be an array)</a:t>
+              <a:t>Step 2: Runtime errors</a:t>
             </a:r>
           </a:p>
         </p:txBody>
@@ -20625,7 +20271,7 @@
           <p:cNvPr id="5" name="Rectangle 4">
             <a:extLst>
               <a:ext uri="{FF2B5EF4-FFF2-40B4-BE49-F238E27FC236}">
-                <a16:creationId xmlns:a16="http://schemas.microsoft.com/office/drawing/2014/main" id="{EB4EFD30-3368-424F-B532-4540DCAC8B89}"/>
+                <a16:creationId xmlns:a16="http://schemas.microsoft.com/office/drawing/2014/main" id="{29C6DCB5-2DA9-4CBF-B3E1-A7988D0308D8}"/>
               </a:ext>
             </a:extLst>
           </p:cNvPr>
@@ -20654,70 +20300,10 @@
           </a:p>
         </p:txBody>
       </p:sp>
-      <p:pic>
-        <p:nvPicPr>
-          <p:cNvPr id="7" name="Picture 6">
-            <a:extLst>
-              <a:ext uri="{FF2B5EF4-FFF2-40B4-BE49-F238E27FC236}">
-                <a16:creationId xmlns:a16="http://schemas.microsoft.com/office/drawing/2014/main" id="{94F2DEA5-8E84-4AEC-A8AB-F23C3E12985A}"/>
-              </a:ext>
-            </a:extLst>
-          </p:cNvPr>
-          <p:cNvPicPr>
-            <a:picLocks noChangeAspect="1"/>
-          </p:cNvPicPr>
-          <p:nvPr/>
-        </p:nvPicPr>
-        <p:blipFill>
-          <a:blip r:embed="rId3"/>
-          <a:stretch>
-            <a:fillRect/>
-          </a:stretch>
-        </p:blipFill>
-        <p:spPr>
-          <a:xfrm>
-            <a:off x="273842" y="3681664"/>
-            <a:ext cx="11888786" cy="1154346"/>
-          </a:xfrm>
-          <a:prstGeom prst="rect">
-            <a:avLst/>
-          </a:prstGeom>
-        </p:spPr>
-      </p:pic>
-      <p:pic>
-        <p:nvPicPr>
-          <p:cNvPr id="9" name="Picture 8">
-            <a:extLst>
-              <a:ext uri="{FF2B5EF4-FFF2-40B4-BE49-F238E27FC236}">
-                <a16:creationId xmlns:a16="http://schemas.microsoft.com/office/drawing/2014/main" id="{2FB2890F-A4A6-4E5B-8F22-A5C712FC81A9}"/>
-              </a:ext>
-            </a:extLst>
-          </p:cNvPr>
-          <p:cNvPicPr>
-            <a:picLocks noChangeAspect="1"/>
-          </p:cNvPicPr>
-          <p:nvPr/>
-        </p:nvPicPr>
-        <p:blipFill>
-          <a:blip r:embed="rId4"/>
-          <a:stretch>
-            <a:fillRect/>
-          </a:stretch>
-        </p:blipFill>
-        <p:spPr>
-          <a:xfrm>
-            <a:off x="6616433" y="1345726"/>
-            <a:ext cx="5206738" cy="1140524"/>
-          </a:xfrm>
-          <a:prstGeom prst="rect">
-            <a:avLst/>
-          </a:prstGeom>
-        </p:spPr>
-      </p:pic>
     </p:spTree>
     <p:extLst>
       <p:ext uri="{BB962C8B-B14F-4D97-AF65-F5344CB8AC3E}">
-        <p14:creationId xmlns:p14="http://schemas.microsoft.com/office/powerpoint/2010/main" val="1476856047"/>
+        <p14:creationId xmlns:p14="http://schemas.microsoft.com/office/powerpoint/2010/main" val="862068945"/>
       </p:ext>
     </p:extLst>
   </p:cSld>
@@ -20749,10 +20335,10 @@
       </p:grpSpPr>
       <p:sp>
         <p:nvSpPr>
-          <p:cNvPr id="4" name="Title 3">
+          <p:cNvPr id="3" name="Text Placeholder 2">
             <a:extLst>
               <a:ext uri="{FF2B5EF4-FFF2-40B4-BE49-F238E27FC236}">
-                <a16:creationId xmlns:a16="http://schemas.microsoft.com/office/drawing/2014/main" id="{BC71B56D-A564-4BB1-B63B-CE04D6472132}"/>
+                <a16:creationId xmlns:a16="http://schemas.microsoft.com/office/drawing/2014/main" id="{94A47A0A-4DFE-4057-B29B-24238CB15434}"/>
               </a:ext>
             </a:extLst>
           </p:cNvPr>
@@ -20760,17 +20346,31 @@
             <a:spLocks noGrp="1"/>
           </p:cNvSpPr>
           <p:nvPr>
-            <p:ph type="title"/>
+            <p:ph type="body" sz="quarter" idx="10"/>
           </p:nvPr>
         </p:nvSpPr>
-        <p:spPr/>
+        <p:spPr>
+          <a:xfrm>
+            <a:off x="273841" y="552531"/>
+            <a:ext cx="11888787" cy="1157240"/>
+          </a:xfrm>
+        </p:spPr>
         <p:txBody>
           <a:bodyPr/>
           <a:lstStyle/>
           <a:p>
             <a:r>
               <a:rPr lang="en-US" dirty="0"/>
-              <a:t>Step 2: Runtime errors</a:t>
+              <a:t>Incorrect range for array elements</a:t>
+            </a:r>
+          </a:p>
+          <a:p>
+            <a:pPr marL="228600" lvl="1" indent="0">
+              <a:buNone/>
+            </a:pPr>
+            <a:r>
+              <a:rPr lang="en-US" dirty="0"/>
+              <a:t>(array elements are indexed from 0 to (Length - 1), inclusive)</a:t>
             </a:r>
           </a:p>
         </p:txBody>
@@ -20780,7 +20380,7 @@
           <p:cNvPr id="5" name="Rectangle 4">
             <a:extLst>
               <a:ext uri="{FF2B5EF4-FFF2-40B4-BE49-F238E27FC236}">
-                <a16:creationId xmlns:a16="http://schemas.microsoft.com/office/drawing/2014/main" id="{29C6DCB5-2DA9-4CBF-B3E1-A7988D0308D8}"/>
+                <a16:creationId xmlns:a16="http://schemas.microsoft.com/office/drawing/2014/main" id="{EB4EFD30-3368-424F-B532-4540DCAC8B89}"/>
               </a:ext>
             </a:extLst>
           </p:cNvPr>
@@ -20809,121 +20409,12 @@
           </a:p>
         </p:txBody>
       </p:sp>
-    </p:spTree>
-    <p:extLst>
-      <p:ext uri="{BB962C8B-B14F-4D97-AF65-F5344CB8AC3E}">
-        <p14:creationId xmlns:p14="http://schemas.microsoft.com/office/powerpoint/2010/main" val="862068945"/>
-      </p:ext>
-    </p:extLst>
-  </p:cSld>
-  <p:clrMapOvr>
-    <a:masterClrMapping/>
-  </p:clrMapOvr>
-  <p:transition>
-    <p:fade/>
-  </p:transition>
-</p:sld>
-</file>
-
-<file path=ppt/slides/slide8.xml><?xml version="1.0" encoding="utf-8"?>
-<p:sld xmlns:a="http://schemas.openxmlformats.org/drawingml/2006/main" xmlns:r="http://schemas.openxmlformats.org/officeDocument/2006/relationships" xmlns:p="http://schemas.openxmlformats.org/presentationml/2006/main">
-  <p:cSld>
-    <p:spTree>
-      <p:nvGrpSpPr>
-        <p:cNvPr id="1" name=""/>
-        <p:cNvGrpSpPr/>
-        <p:nvPr/>
-      </p:nvGrpSpPr>
-      <p:grpSpPr>
-        <a:xfrm>
-          <a:off x="0" y="0"/>
-          <a:ext cx="0" cy="0"/>
-          <a:chOff x="0" y="0"/>
-          <a:chExt cx="0" cy="0"/>
-        </a:xfrm>
-      </p:grpSpPr>
-      <p:sp>
-        <p:nvSpPr>
-          <p:cNvPr id="3" name="Text Placeholder 2">
+      <p:pic>
+        <p:nvPicPr>
+          <p:cNvPr id="4" name="Picture 3">
             <a:extLst>
               <a:ext uri="{FF2B5EF4-FFF2-40B4-BE49-F238E27FC236}">
-                <a16:creationId xmlns:a16="http://schemas.microsoft.com/office/drawing/2014/main" id="{94A47A0A-4DFE-4057-B29B-24238CB15434}"/>
-              </a:ext>
-            </a:extLst>
-          </p:cNvPr>
-          <p:cNvSpPr>
-            <a:spLocks noGrp="1"/>
-          </p:cNvSpPr>
-          <p:nvPr>
-            <p:ph type="body" sz="quarter" idx="10"/>
-          </p:nvPr>
-        </p:nvSpPr>
-        <p:spPr>
-          <a:xfrm>
-            <a:off x="273841" y="552531"/>
-            <a:ext cx="11888787" cy="1157240"/>
-          </a:xfrm>
-        </p:spPr>
-        <p:txBody>
-          <a:bodyPr/>
-          <a:lstStyle/>
-          <a:p>
-            <a:r>
-              <a:rPr lang="en-US" dirty="0"/>
-              <a:t>Incorrect range for array elements</a:t>
-            </a:r>
-          </a:p>
-          <a:p>
-            <a:pPr marL="228600" lvl="1" indent="0">
-              <a:buNone/>
-            </a:pPr>
-            <a:r>
-              <a:rPr lang="en-US" dirty="0"/>
-              <a:t>(array elements are indexed from 0 to (Length - 1), inclusive)</a:t>
-            </a:r>
-          </a:p>
-        </p:txBody>
-      </p:sp>
-      <p:sp>
-        <p:nvSpPr>
-          <p:cNvPr id="5" name="Rectangle 4">
-            <a:extLst>
-              <a:ext uri="{FF2B5EF4-FFF2-40B4-BE49-F238E27FC236}">
-                <a16:creationId xmlns:a16="http://schemas.microsoft.com/office/drawing/2014/main" id="{EB4EFD30-3368-424F-B532-4540DCAC8B89}"/>
-              </a:ext>
-            </a:extLst>
-          </p:cNvPr>
-          <p:cNvSpPr/>
-          <p:nvPr/>
-        </p:nvSpPr>
-        <p:spPr>
-          <a:xfrm>
-            <a:off x="10003378" y="6687063"/>
-            <a:ext cx="2238113" cy="246221"/>
-          </a:xfrm>
-          <a:prstGeom prst="rect">
-            <a:avLst/>
-          </a:prstGeom>
-        </p:spPr>
-        <p:txBody>
-          <a:bodyPr wrap="none">
-            <a:spAutoFit/>
-          </a:bodyPr>
-          <a:lstStyle/>
-          <a:p>
-            <a:r>
-              <a:rPr lang="en-US" sz="1000" dirty="0"/>
-              <a:t>(c) 2020 Microsoft. All rights reserved.</a:t>
-            </a:r>
-          </a:p>
-        </p:txBody>
-      </p:sp>
-      <p:pic>
-        <p:nvPicPr>
-          <p:cNvPr id="6" name="Picture 5">
-            <a:extLst>
-              <a:ext uri="{FF2B5EF4-FFF2-40B4-BE49-F238E27FC236}">
-                <a16:creationId xmlns:a16="http://schemas.microsoft.com/office/drawing/2014/main" id="{093DCEAD-A852-4037-B989-164702FAD705}"/>
+                <a16:creationId xmlns:a16="http://schemas.microsoft.com/office/drawing/2014/main" id="{F8478A58-054A-1FD9-D76A-510888F3C4B5}"/>
               </a:ext>
             </a:extLst>
           </p:cNvPr>
@@ -20940,8 +20431,8 @@
         </p:blipFill>
         <p:spPr>
           <a:xfrm>
-            <a:off x="2000634" y="2283900"/>
-            <a:ext cx="8215072" cy="1493649"/>
+            <a:off x="3927861" y="2462557"/>
+            <a:ext cx="4580744" cy="1157240"/>
           </a:xfrm>
           <a:prstGeom prst="rect">
             <a:avLst/>
@@ -20950,10 +20441,10 @@
       </p:pic>
       <p:pic>
         <p:nvPicPr>
-          <p:cNvPr id="9" name="Picture 8">
+          <p:cNvPr id="8" name="Picture 7">
             <a:extLst>
               <a:ext uri="{FF2B5EF4-FFF2-40B4-BE49-F238E27FC236}">
-                <a16:creationId xmlns:a16="http://schemas.microsoft.com/office/drawing/2014/main" id="{AA7AD02C-F2CE-4DB7-8E0B-D8B153630469}"/>
+                <a16:creationId xmlns:a16="http://schemas.microsoft.com/office/drawing/2014/main" id="{921325A3-ACCE-FC42-4DA2-29478A499AA6}"/>
               </a:ext>
             </a:extLst>
           </p:cNvPr>
@@ -20970,8 +20461,8 @@
         </p:blipFill>
         <p:spPr>
           <a:xfrm>
-            <a:off x="273841" y="4281639"/>
-            <a:ext cx="11888787" cy="1552925"/>
+            <a:off x="1922927" y="4587696"/>
+            <a:ext cx="8590613" cy="983764"/>
           </a:xfrm>
           <a:prstGeom prst="rect">
             <a:avLst/>
@@ -20994,7 +20485,7 @@
 </p:sld>
 </file>
 
-<file path=ppt/slides/slide9.xml><?xml version="1.0" encoding="utf-8"?>
+<file path=ppt/slides/slide8.xml><?xml version="1.0" encoding="utf-8"?>
 <p:sld xmlns:a="http://schemas.openxmlformats.org/drawingml/2006/main" xmlns:r="http://schemas.openxmlformats.org/officeDocument/2006/relationships" xmlns:p="http://schemas.openxmlformats.org/presentationml/2006/main">
   <p:cSld>
     <p:spTree>
@@ -21032,7 +20523,7 @@
             <p:spPr>
               <a:xfrm>
                 <a:off x="273841" y="552531"/>
-                <a:ext cx="11888787" cy="2289858"/>
+                <a:ext cx="11888787" cy="1292662"/>
               </a:xfrm>
             </p:spPr>
             <p:txBody>
@@ -21041,14 +20532,7 @@
               <a:p>
                 <a:r>
                   <a:rPr lang="en-US" dirty="0"/>
-                  <a:t>Released qubits must be </a:t>
-                </a:r>
-                <a:br>
-                  <a:rPr lang="en-US" dirty="0"/>
-                </a:br>
-                <a:r>
-                  <a:rPr lang="en-US" dirty="0"/>
-                  <a:t>in the </a:t>
+                  <a:t>Released qubits must be in the </a:t>
                 </a:r>
                 <a14:m>
                   <m:oMath xmlns:m="http://schemas.openxmlformats.org/officeDocument/2006/math">
@@ -21107,7 +20591,7 @@
                 </a14:m>
                 <a:r>
                   <a:rPr lang="en-US" dirty="0"/>
-                  <a:t> state or measured</a:t>
+                  <a:t> state</a:t>
                 </a:r>
               </a:p>
               <a:p>
@@ -21116,14 +20600,7 @@
                 </a:pPr>
                 <a:r>
                   <a:rPr lang="en-US" dirty="0"/>
-                  <a:t>  (here the auxiliary qubit </a:t>
-                </a:r>
-                <a:br>
-                  <a:rPr lang="en-US" dirty="0"/>
-                </a:br>
-                <a:r>
-                  <a:rPr lang="en-US" dirty="0"/>
-                  <a:t>   is in the </a:t>
+                  <a:t>  (here the auxiliary qubit is released in the </a:t>
                 </a:r>
                 <a14:m>
                   <m:oMath xmlns:m="http://schemas.openxmlformats.org/officeDocument/2006/math">
@@ -21208,7 +20685,7 @@
             <p:spPr>
               <a:xfrm>
                 <a:off x="273841" y="552531"/>
-                <a:ext cx="11888787" cy="2289858"/>
+                <a:ext cx="11888787" cy="1292662"/>
               </a:xfrm>
               <a:blipFill>
                 <a:blip r:embed="rId3"/>
@@ -21268,10 +20745,10 @@
       </p:sp>
       <p:pic>
         <p:nvPicPr>
-          <p:cNvPr id="6" name="Picture 5">
+          <p:cNvPr id="4" name="Picture 3">
             <a:extLst>
               <a:ext uri="{FF2B5EF4-FFF2-40B4-BE49-F238E27FC236}">
-                <a16:creationId xmlns:a16="http://schemas.microsoft.com/office/drawing/2014/main" id="{BD36AE05-70CE-4F34-BF54-B96CF98B592E}"/>
+                <a16:creationId xmlns:a16="http://schemas.microsoft.com/office/drawing/2014/main" id="{5C56D155-F8FC-0921-3345-91F0CA95345A}"/>
               </a:ext>
             </a:extLst>
           </p:cNvPr>
@@ -21288,8 +20765,8 @@
         </p:blipFill>
         <p:spPr>
           <a:xfrm>
-            <a:off x="6698615" y="552531"/>
-            <a:ext cx="5464013" cy="2972058"/>
+            <a:off x="3068655" y="2610656"/>
+            <a:ext cx="6299163" cy="961883"/>
           </a:xfrm>
           <a:prstGeom prst="rect">
             <a:avLst/>
@@ -21298,10 +20775,10 @@
       </p:pic>
       <p:pic>
         <p:nvPicPr>
-          <p:cNvPr id="9" name="Picture 8">
+          <p:cNvPr id="8" name="Picture 7">
             <a:extLst>
               <a:ext uri="{FF2B5EF4-FFF2-40B4-BE49-F238E27FC236}">
-                <a16:creationId xmlns:a16="http://schemas.microsoft.com/office/drawing/2014/main" id="{70A2B116-3B87-40FD-A578-085F6D2283B2}"/>
+                <a16:creationId xmlns:a16="http://schemas.microsoft.com/office/drawing/2014/main" id="{22E64195-7C0A-F67C-D17F-C7305A5E071F}"/>
               </a:ext>
             </a:extLst>
           </p:cNvPr>
@@ -21318,8 +20795,8 @@
         </p:blipFill>
         <p:spPr>
           <a:xfrm>
-            <a:off x="1676320" y="3787452"/>
-            <a:ext cx="9083827" cy="2636748"/>
+            <a:off x="3114332" y="4520524"/>
+            <a:ext cx="6207803" cy="1433707"/>
           </a:xfrm>
           <a:prstGeom prst="rect">
             <a:avLst/>
@@ -21330,6 +20807,101 @@
     <p:extLst>
       <p:ext uri="{BB962C8B-B14F-4D97-AF65-F5344CB8AC3E}">
         <p14:creationId xmlns:p14="http://schemas.microsoft.com/office/powerpoint/2010/main" val="3608799047"/>
+      </p:ext>
+    </p:extLst>
+  </p:cSld>
+  <p:clrMapOvr>
+    <a:masterClrMapping/>
+  </p:clrMapOvr>
+  <p:transition>
+    <p:fade/>
+  </p:transition>
+</p:sld>
+</file>
+
+<file path=ppt/slides/slide9.xml><?xml version="1.0" encoding="utf-8"?>
+<p:sld xmlns:a="http://schemas.openxmlformats.org/drawingml/2006/main" xmlns:r="http://schemas.openxmlformats.org/officeDocument/2006/relationships" xmlns:p="http://schemas.openxmlformats.org/presentationml/2006/main">
+  <p:cSld>
+    <p:spTree>
+      <p:nvGrpSpPr>
+        <p:cNvPr id="1" name=""/>
+        <p:cNvGrpSpPr/>
+        <p:nvPr/>
+      </p:nvGrpSpPr>
+      <p:grpSpPr>
+        <a:xfrm>
+          <a:off x="0" y="0"/>
+          <a:ext cx="0" cy="0"/>
+          <a:chOff x="0" y="0"/>
+          <a:chExt cx="0" cy="0"/>
+        </a:xfrm>
+      </p:grpSpPr>
+      <p:sp>
+        <p:nvSpPr>
+          <p:cNvPr id="4" name="Title 3">
+            <a:extLst>
+              <a:ext uri="{FF2B5EF4-FFF2-40B4-BE49-F238E27FC236}">
+                <a16:creationId xmlns:a16="http://schemas.microsoft.com/office/drawing/2014/main" id="{BC71B56D-A564-4BB1-B63B-CE04D6472132}"/>
+              </a:ext>
+            </a:extLst>
+          </p:cNvPr>
+          <p:cNvSpPr>
+            <a:spLocks noGrp="1"/>
+          </p:cNvSpPr>
+          <p:nvPr>
+            <p:ph type="title"/>
+          </p:nvPr>
+        </p:nvSpPr>
+        <p:spPr/>
+        <p:txBody>
+          <a:bodyPr/>
+          <a:lstStyle/>
+          <a:p>
+            <a:r>
+              <a:rPr lang="en-US" dirty="0"/>
+              <a:t>Step 3: Logic/runtime errors</a:t>
+            </a:r>
+          </a:p>
+        </p:txBody>
+      </p:sp>
+      <p:sp>
+        <p:nvSpPr>
+          <p:cNvPr id="5" name="Rectangle 4">
+            <a:extLst>
+              <a:ext uri="{FF2B5EF4-FFF2-40B4-BE49-F238E27FC236}">
+                <a16:creationId xmlns:a16="http://schemas.microsoft.com/office/drawing/2014/main" id="{29C6DCB5-2DA9-4CBF-B3E1-A7988D0308D8}"/>
+              </a:ext>
+            </a:extLst>
+          </p:cNvPr>
+          <p:cNvSpPr/>
+          <p:nvPr/>
+        </p:nvSpPr>
+        <p:spPr>
+          <a:xfrm>
+            <a:off x="10003378" y="6687063"/>
+            <a:ext cx="2238113" cy="246221"/>
+          </a:xfrm>
+          <a:prstGeom prst="rect">
+            <a:avLst/>
+          </a:prstGeom>
+        </p:spPr>
+        <p:txBody>
+          <a:bodyPr wrap="none">
+            <a:spAutoFit/>
+          </a:bodyPr>
+          <a:lstStyle/>
+          <a:p>
+            <a:r>
+              <a:rPr lang="en-US" sz="1000" dirty="0"/>
+              <a:t>(c) 2020 Microsoft. All rights reserved.</a:t>
+            </a:r>
+          </a:p>
+        </p:txBody>
+      </p:sp>
+    </p:spTree>
+    <p:extLst>
+      <p:ext uri="{BB962C8B-B14F-4D97-AF65-F5344CB8AC3E}">
+        <p14:creationId xmlns:p14="http://schemas.microsoft.com/office/powerpoint/2010/main" val="3955919327"/>
       </p:ext>
     </p:extLst>
   </p:cSld>
@@ -23117,6 +22689,23 @@
 </file>
 
 <file path=customXml/item1.xml><?xml version="1.0" encoding="utf-8"?>
+<?mso-contentType ?>
+<FormTemplates xmlns="http://schemas.microsoft.com/sharepoint/v3/contenttype/forms">
+  <Display>DocumentLibraryForm</Display>
+  <Edit>DocumentLibraryForm</Edit>
+  <New>DocumentLibraryForm</New>
+</FormTemplates>
+</file>
+
+<file path=customXml/item2.xml><?xml version="1.0" encoding="utf-8"?>
+<p:properties xmlns:p="http://schemas.microsoft.com/office/2006/metadata/properties" xmlns:xsi="http://www.w3.org/2001/XMLSchema-instance" xmlns:pc="http://schemas.microsoft.com/office/infopath/2007/PartnerControls">
+  <documentManagement>
+    <MediaServiceKeyPoints xmlns="21434ad0-cc55-4e7e-bebf-93b44e247767" xsi:nil="true"/>
+  </documentManagement>
+</p:properties>
+</file>
+
+<file path=customXml/item3.xml><?xml version="1.0" encoding="utf-8"?>
 <ct:contentTypeSchema xmlns:ct="http://schemas.microsoft.com/office/2006/metadata/contentType" xmlns:ma="http://schemas.microsoft.com/office/2006/metadata/properties/metaAttributes" ct:_="" ma:_="" ma:contentTypeName="Document" ma:contentTypeID="0x010100ABE0CA9DE9A74A419105A5B1FD90B2D0" ma:contentTypeVersion="14" ma:contentTypeDescription="Create a new document." ma:contentTypeScope="" ma:versionID="d07815db107717080c9da2ea26cbd810">
   <xsd:schema xmlns:xsd="http://www.w3.org/2001/XMLSchema" xmlns:xs="http://www.w3.org/2001/XMLSchema" xmlns:p="http://schemas.microsoft.com/office/2006/metadata/properties" xmlns:ns2="21434ad0-cc55-4e7e-bebf-93b44e247767" xmlns:ns3="b0c72a6f-614d-40c9-bdd1-1bd9979bfa3b" targetNamespace="http://schemas.microsoft.com/office/2006/metadata/properties" ma:root="true" ma:fieldsID="20882b29d9adc3ce4827553abd9f7302" ns2:_="" ns3:_="">
     <xsd:import namespace="21434ad0-cc55-4e7e-bebf-93b44e247767"/>
@@ -23345,38 +22934,10 @@
 </ct:contentTypeSchema>
 </file>
 
-<file path=customXml/item2.xml><?xml version="1.0" encoding="utf-8"?>
-<p:properties xmlns:p="http://schemas.microsoft.com/office/2006/metadata/properties" xmlns:xsi="http://www.w3.org/2001/XMLSchema-instance" xmlns:pc="http://schemas.microsoft.com/office/infopath/2007/PartnerControls">
-  <documentManagement>
-    <MediaServiceKeyPoints xmlns="21434ad0-cc55-4e7e-bebf-93b44e247767" xsi:nil="true"/>
-  </documentManagement>
-</p:properties>
-</file>
-
-<file path=customXml/item3.xml><?xml version="1.0" encoding="utf-8"?>
-<?mso-contentType ?>
-<FormTemplates xmlns="http://schemas.microsoft.com/sharepoint/v3/contenttype/forms">
-  <Display>DocumentLibraryForm</Display>
-  <Edit>DocumentLibraryForm</Edit>
-  <New>DocumentLibraryForm</New>
-</FormTemplates>
-</file>
-
 <file path=customXml/itemProps1.xml><?xml version="1.0" encoding="utf-8"?>
-<ds:datastoreItem xmlns:ds="http://schemas.openxmlformats.org/officeDocument/2006/customXml" ds:itemID="{0EB54466-8129-4723-8C2F-2514141319D8}">
+<ds:datastoreItem xmlns:ds="http://schemas.openxmlformats.org/officeDocument/2006/customXml" ds:itemID="{758FDAC0-319D-4A54-8D8E-1D42CB1F8004}">
   <ds:schemaRefs>
-    <ds:schemaRef ds:uri="http://schemas.microsoft.com/office/2006/metadata/contentType"/>
-    <ds:schemaRef ds:uri="http://schemas.microsoft.com/office/2006/metadata/properties/metaAttributes"/>
-    <ds:schemaRef ds:uri="http://www.w3.org/2001/XMLSchema"/>
-    <ds:schemaRef ds:uri="http://schemas.microsoft.com/office/2006/metadata/properties"/>
-    <ds:schemaRef ds:uri="21434ad0-cc55-4e7e-bebf-93b44e247767"/>
-    <ds:schemaRef ds:uri="b0c72a6f-614d-40c9-bdd1-1bd9979bfa3b"/>
-    <ds:schemaRef ds:uri="http://schemas.microsoft.com/office/2006/documentManagement/types"/>
-    <ds:schemaRef ds:uri="http://schemas.microsoft.com/office/infopath/2007/PartnerControls"/>
-    <ds:schemaRef ds:uri="http://schemas.openxmlformats.org/package/2006/metadata/core-properties"/>
-    <ds:schemaRef ds:uri="http://purl.org/dc/elements/1.1/"/>
-    <ds:schemaRef ds:uri="http://purl.org/dc/terms/"/>
-    <ds:schemaRef ds:uri="http://schemas.microsoft.com/internal/obd"/>
+    <ds:schemaRef ds:uri="http://schemas.microsoft.com/sharepoint/v3/contenttype/forms"/>
   </ds:schemaRefs>
 </ds:datastoreItem>
 </file>
@@ -23399,9 +22960,20 @@
 </file>
 
 <file path=customXml/itemProps3.xml><?xml version="1.0" encoding="utf-8"?>
-<ds:datastoreItem xmlns:ds="http://schemas.openxmlformats.org/officeDocument/2006/customXml" ds:itemID="{758FDAC0-319D-4A54-8D8E-1D42CB1F8004}">
+<ds:datastoreItem xmlns:ds="http://schemas.openxmlformats.org/officeDocument/2006/customXml" ds:itemID="{0EB54466-8129-4723-8C2F-2514141319D8}">
   <ds:schemaRefs>
-    <ds:schemaRef ds:uri="http://schemas.microsoft.com/sharepoint/v3/contenttype/forms"/>
+    <ds:schemaRef ds:uri="http://schemas.microsoft.com/office/2006/metadata/contentType"/>
+    <ds:schemaRef ds:uri="http://schemas.microsoft.com/office/2006/metadata/properties/metaAttributes"/>
+    <ds:schemaRef ds:uri="http://www.w3.org/2001/XMLSchema"/>
+    <ds:schemaRef ds:uri="http://schemas.microsoft.com/office/2006/metadata/properties"/>
+    <ds:schemaRef ds:uri="21434ad0-cc55-4e7e-bebf-93b44e247767"/>
+    <ds:schemaRef ds:uri="b0c72a6f-614d-40c9-bdd1-1bd9979bfa3b"/>
+    <ds:schemaRef ds:uri="http://schemas.microsoft.com/office/2006/documentManagement/types"/>
+    <ds:schemaRef ds:uri="http://schemas.microsoft.com/office/infopath/2007/PartnerControls"/>
+    <ds:schemaRef ds:uri="http://schemas.openxmlformats.org/package/2006/metadata/core-properties"/>
+    <ds:schemaRef ds:uri="http://purl.org/dc/elements/1.1/"/>
+    <ds:schemaRef ds:uri="http://purl.org/dc/terms/"/>
+    <ds:schemaRef ds:uri="http://schemas.microsoft.com/internal/obd"/>
   </ds:schemaRefs>
 </ds:datastoreItem>
 </file>

</xml_diff>